<commit_message>
Combined Slide Deck Final
</commit_message>
<xml_diff>
--- a/Combined Slidedeck.pptx
+++ b/Combined Slidedeck.pptx
@@ -5,7 +5,7 @@
     <p:sldMasterId id="2147483648" r:id="rId1"/>
   </p:sldMasterIdLst>
   <p:notesMasterIdLst>
-    <p:notesMasterId r:id="rId25"/>
+    <p:notesMasterId r:id="rId30"/>
   </p:notesMasterIdLst>
   <p:sldIdLst>
     <p:sldId id="267" r:id="rId2"/>
@@ -19,18 +19,23 @@
     <p:sldId id="257" r:id="rId10"/>
     <p:sldId id="258" r:id="rId11"/>
     <p:sldId id="259" r:id="rId12"/>
-    <p:sldId id="262" r:id="rId13"/>
-    <p:sldId id="263" r:id="rId14"/>
-    <p:sldId id="264" r:id="rId15"/>
-    <p:sldId id="265" r:id="rId16"/>
-    <p:sldId id="266" r:id="rId17"/>
-    <p:sldId id="260" r:id="rId18"/>
-    <p:sldId id="261" r:id="rId19"/>
-    <p:sldId id="274" r:id="rId20"/>
-    <p:sldId id="275" r:id="rId21"/>
-    <p:sldId id="276" r:id="rId22"/>
-    <p:sldId id="277" r:id="rId23"/>
-    <p:sldId id="278" r:id="rId24"/>
+    <p:sldId id="263" r:id="rId13"/>
+    <p:sldId id="264" r:id="rId14"/>
+    <p:sldId id="265" r:id="rId15"/>
+    <p:sldId id="266" r:id="rId16"/>
+    <p:sldId id="260" r:id="rId17"/>
+    <p:sldId id="261" r:id="rId18"/>
+    <p:sldId id="280" r:id="rId19"/>
+    <p:sldId id="281" r:id="rId20"/>
+    <p:sldId id="282" r:id="rId21"/>
+    <p:sldId id="283" r:id="rId22"/>
+    <p:sldId id="284" r:id="rId23"/>
+    <p:sldId id="277" r:id="rId24"/>
+    <p:sldId id="278" r:id="rId25"/>
+    <p:sldId id="274" r:id="rId26"/>
+    <p:sldId id="275" r:id="rId27"/>
+    <p:sldId id="276" r:id="rId28"/>
+    <p:sldId id="279" r:id="rId29"/>
   </p:sldIdLst>
   <p:sldSz cx="12192000" cy="6858000"/>
   <p:notesSz cx="6858000" cy="9144000"/>
@@ -552,7 +557,7 @@
           <a:p>
             <a:fld id="{54F66277-1231-2A45-B961-C920BC9B8042}" type="slidenum">
               <a:rPr lang="en-US" smtClean="0"/>
-              <a:t>16</a:t>
+              <a:t>15</a:t>
             </a:fld>
             <a:endParaRPr lang="en-US"/>
           </a:p>
@@ -636,7 +641,7 @@
           <a:p>
             <a:fld id="{54F66277-1231-2A45-B961-C920BC9B8042}" type="slidenum">
               <a:rPr lang="en-US" smtClean="0"/>
-              <a:t>18</a:t>
+              <a:t>17</a:t>
             </a:fld>
             <a:endParaRPr lang="en-US"/>
           </a:p>
@@ -720,7 +725,7 @@
           <a:p>
             <a:fld id="{54F66277-1231-2A45-B961-C920BC9B8042}" type="slidenum">
               <a:rPr lang="en-US" smtClean="0"/>
-              <a:t>19</a:t>
+              <a:t>23</a:t>
             </a:fld>
             <a:endParaRPr lang="en-US"/>
           </a:p>
@@ -729,7 +734,7 @@
     </p:spTree>
     <p:extLst>
       <p:ext uri="{BB962C8B-B14F-4D97-AF65-F5344CB8AC3E}">
-        <p14:creationId xmlns:p14="http://schemas.microsoft.com/office/powerpoint/2010/main" val="2068543282"/>
+        <p14:creationId xmlns:p14="http://schemas.microsoft.com/office/powerpoint/2010/main" val="1758019677"/>
       </p:ext>
     </p:extLst>
   </p:cSld>
@@ -802,9 +807,9 @@
           <a:bodyPr/>
           <a:lstStyle/>
           <a:p>
-            <a:fld id="{54F66277-1231-2A45-B961-C920BC9B8042}" type="slidenum">
+            <a:fld id="{5F87D9E0-510D-0F43-A304-A9F42220FEDB}" type="slidenum">
               <a:rPr lang="en-US" smtClean="0"/>
-              <a:t>21</a:t>
+              <a:t>24</a:t>
             </a:fld>
             <a:endParaRPr lang="en-US"/>
           </a:p>
@@ -813,7 +818,7 @@
     </p:spTree>
     <p:extLst>
       <p:ext uri="{BB962C8B-B14F-4D97-AF65-F5344CB8AC3E}">
-        <p14:creationId xmlns:p14="http://schemas.microsoft.com/office/powerpoint/2010/main" val="150284075"/>
+        <p14:creationId xmlns:p14="http://schemas.microsoft.com/office/powerpoint/2010/main" val="1771123280"/>
       </p:ext>
     </p:extLst>
   </p:cSld>
@@ -888,7 +893,7 @@
           <a:p>
             <a:fld id="{54F66277-1231-2A45-B961-C920BC9B8042}" type="slidenum">
               <a:rPr lang="en-US" smtClean="0"/>
-              <a:t>22</a:t>
+              <a:t>25</a:t>
             </a:fld>
             <a:endParaRPr lang="en-US"/>
           </a:p>
@@ -897,7 +902,7 @@
     </p:spTree>
     <p:extLst>
       <p:ext uri="{BB962C8B-B14F-4D97-AF65-F5344CB8AC3E}">
-        <p14:creationId xmlns:p14="http://schemas.microsoft.com/office/powerpoint/2010/main" val="1758019677"/>
+        <p14:creationId xmlns:p14="http://schemas.microsoft.com/office/powerpoint/2010/main" val="2068543282"/>
       </p:ext>
     </p:extLst>
   </p:cSld>
@@ -970,9 +975,9 @@
           <a:bodyPr/>
           <a:lstStyle/>
           <a:p>
-            <a:fld id="{5F87D9E0-510D-0F43-A304-A9F42220FEDB}" type="slidenum">
+            <a:fld id="{54F66277-1231-2A45-B961-C920BC9B8042}" type="slidenum">
               <a:rPr lang="en-US" smtClean="0"/>
-              <a:t>23</a:t>
+              <a:t>26</a:t>
             </a:fld>
             <a:endParaRPr lang="en-US"/>
           </a:p>
@@ -981,7 +986,175 @@
     </p:spTree>
     <p:extLst>
       <p:ext uri="{BB962C8B-B14F-4D97-AF65-F5344CB8AC3E}">
-        <p14:creationId xmlns:p14="http://schemas.microsoft.com/office/powerpoint/2010/main" val="1771123280"/>
+        <p14:creationId xmlns:p14="http://schemas.microsoft.com/office/powerpoint/2010/main" val="55842182"/>
+      </p:ext>
+    </p:extLst>
+  </p:cSld>
+  <p:clrMapOvr>
+    <a:masterClrMapping/>
+  </p:clrMapOvr>
+</p:notes>
+</file>
+
+<file path=ppt/notesSlides/notesSlide7.xml><?xml version="1.0" encoding="utf-8"?>
+<p:notes xmlns:a="http://schemas.openxmlformats.org/drawingml/2006/main" xmlns:r="http://schemas.openxmlformats.org/officeDocument/2006/relationships" xmlns:p="http://schemas.openxmlformats.org/presentationml/2006/main">
+  <p:cSld>
+    <p:spTree>
+      <p:nvGrpSpPr>
+        <p:cNvPr id="1" name=""/>
+        <p:cNvGrpSpPr/>
+        <p:nvPr/>
+      </p:nvGrpSpPr>
+      <p:grpSpPr>
+        <a:xfrm>
+          <a:off x="0" y="0"/>
+          <a:ext cx="0" cy="0"/>
+          <a:chOff x="0" y="0"/>
+          <a:chExt cx="0" cy="0"/>
+        </a:xfrm>
+      </p:grpSpPr>
+      <p:sp>
+        <p:nvSpPr>
+          <p:cNvPr id="2" name="Slide Image Placeholder 1"/>
+          <p:cNvSpPr>
+            <a:spLocks noGrp="1" noRot="1" noChangeAspect="1"/>
+          </p:cNvSpPr>
+          <p:nvPr>
+            <p:ph type="sldImg"/>
+          </p:nvPr>
+        </p:nvSpPr>
+        <p:spPr/>
+      </p:sp>
+      <p:sp>
+        <p:nvSpPr>
+          <p:cNvPr id="3" name="Notes Placeholder 2"/>
+          <p:cNvSpPr>
+            <a:spLocks noGrp="1"/>
+          </p:cNvSpPr>
+          <p:nvPr>
+            <p:ph type="body" idx="1"/>
+          </p:nvPr>
+        </p:nvSpPr>
+        <p:spPr/>
+        <p:txBody>
+          <a:bodyPr/>
+          <a:lstStyle/>
+          <a:p>
+            <a:endParaRPr lang="en-US" dirty="0"/>
+          </a:p>
+        </p:txBody>
+      </p:sp>
+      <p:sp>
+        <p:nvSpPr>
+          <p:cNvPr id="4" name="Slide Number Placeholder 3"/>
+          <p:cNvSpPr>
+            <a:spLocks noGrp="1"/>
+          </p:cNvSpPr>
+          <p:nvPr>
+            <p:ph type="sldNum" sz="quarter" idx="10"/>
+          </p:nvPr>
+        </p:nvSpPr>
+        <p:spPr/>
+        <p:txBody>
+          <a:bodyPr/>
+          <a:lstStyle/>
+          <a:p>
+            <a:fld id="{54F66277-1231-2A45-B961-C920BC9B8042}" type="slidenum">
+              <a:rPr lang="en-US" smtClean="0"/>
+              <a:t>27</a:t>
+            </a:fld>
+            <a:endParaRPr lang="en-US"/>
+          </a:p>
+        </p:txBody>
+      </p:sp>
+    </p:spTree>
+    <p:extLst>
+      <p:ext uri="{BB962C8B-B14F-4D97-AF65-F5344CB8AC3E}">
+        <p14:creationId xmlns:p14="http://schemas.microsoft.com/office/powerpoint/2010/main" val="150284075"/>
+      </p:ext>
+    </p:extLst>
+  </p:cSld>
+  <p:clrMapOvr>
+    <a:masterClrMapping/>
+  </p:clrMapOvr>
+</p:notes>
+</file>
+
+<file path=ppt/notesSlides/notesSlide8.xml><?xml version="1.0" encoding="utf-8"?>
+<p:notes xmlns:a="http://schemas.openxmlformats.org/drawingml/2006/main" xmlns:r="http://schemas.openxmlformats.org/officeDocument/2006/relationships" xmlns:p="http://schemas.openxmlformats.org/presentationml/2006/main">
+  <p:cSld>
+    <p:spTree>
+      <p:nvGrpSpPr>
+        <p:cNvPr id="1" name=""/>
+        <p:cNvGrpSpPr/>
+        <p:nvPr/>
+      </p:nvGrpSpPr>
+      <p:grpSpPr>
+        <a:xfrm>
+          <a:off x="0" y="0"/>
+          <a:ext cx="0" cy="0"/>
+          <a:chOff x="0" y="0"/>
+          <a:chExt cx="0" cy="0"/>
+        </a:xfrm>
+      </p:grpSpPr>
+      <p:sp>
+        <p:nvSpPr>
+          <p:cNvPr id="2" name="Slide Image Placeholder 1"/>
+          <p:cNvSpPr>
+            <a:spLocks noGrp="1" noRot="1" noChangeAspect="1"/>
+          </p:cNvSpPr>
+          <p:nvPr>
+            <p:ph type="sldImg"/>
+          </p:nvPr>
+        </p:nvSpPr>
+        <p:spPr/>
+      </p:sp>
+      <p:sp>
+        <p:nvSpPr>
+          <p:cNvPr id="3" name="Notes Placeholder 2"/>
+          <p:cNvSpPr>
+            <a:spLocks noGrp="1"/>
+          </p:cNvSpPr>
+          <p:nvPr>
+            <p:ph type="body" idx="1"/>
+          </p:nvPr>
+        </p:nvSpPr>
+        <p:spPr/>
+        <p:txBody>
+          <a:bodyPr/>
+          <a:lstStyle/>
+          <a:p>
+            <a:endParaRPr lang="en-US" dirty="0"/>
+          </a:p>
+        </p:txBody>
+      </p:sp>
+      <p:sp>
+        <p:nvSpPr>
+          <p:cNvPr id="4" name="Slide Number Placeholder 3"/>
+          <p:cNvSpPr>
+            <a:spLocks noGrp="1"/>
+          </p:cNvSpPr>
+          <p:nvPr>
+            <p:ph type="sldNum" sz="quarter" idx="10"/>
+          </p:nvPr>
+        </p:nvSpPr>
+        <p:spPr/>
+        <p:txBody>
+          <a:bodyPr/>
+          <a:lstStyle/>
+          <a:p>
+            <a:fld id="{54F66277-1231-2A45-B961-C920BC9B8042}" type="slidenum">
+              <a:rPr lang="en-US" smtClean="0"/>
+              <a:t>28</a:t>
+            </a:fld>
+            <a:endParaRPr lang="en-US"/>
+          </a:p>
+        </p:txBody>
+      </p:sp>
+    </p:spTree>
+    <p:extLst>
+      <p:ext uri="{BB962C8B-B14F-4D97-AF65-F5344CB8AC3E}">
+        <p14:creationId xmlns:p14="http://schemas.microsoft.com/office/powerpoint/2010/main" val="1912700105"/>
       </p:ext>
     </p:extLst>
   </p:cSld>
@@ -6536,7 +6709,7 @@
             <a:spLocks noGrp="1"/>
           </p:cNvSpPr>
           <p:nvPr>
-            <p:ph type="ctrTitle"/>
+            <p:ph type="title"/>
           </p:nvPr>
         </p:nvSpPr>
         <p:spPr/>
@@ -6546,83 +6719,9 @@
           <a:p>
             <a:r>
               <a:rPr lang="en-US" dirty="0" smtClean="0"/>
-              <a:t>Do </a:t>
-            </a:r>
-            <a:r>
-              <a:rPr lang="en-US" dirty="0"/>
-              <a:t>campaign contributions lead to electoral success</a:t>
-            </a:r>
-          </a:p>
-        </p:txBody>
-      </p:sp>
-      <p:sp>
-        <p:nvSpPr>
-          <p:cNvPr id="3" name="Subtitle 2"/>
-          <p:cNvSpPr>
-            <a:spLocks noGrp="1"/>
-          </p:cNvSpPr>
-          <p:nvPr>
-            <p:ph type="subTitle" idx="1"/>
-          </p:nvPr>
-        </p:nvSpPr>
-        <p:spPr/>
-        <p:txBody>
-          <a:bodyPr/>
-          <a:lstStyle/>
-          <a:p>
-            <a:endParaRPr lang="en-US"/>
-          </a:p>
-        </p:txBody>
-      </p:sp>
-    </p:spTree>
-    <p:extLst>
-      <p:ext uri="{BB962C8B-B14F-4D97-AF65-F5344CB8AC3E}">
-        <p14:creationId xmlns:p14="http://schemas.microsoft.com/office/powerpoint/2010/main" val="838614382"/>
-      </p:ext>
-    </p:extLst>
-  </p:cSld>
-  <p:clrMapOvr>
-    <a:masterClrMapping/>
-  </p:clrMapOvr>
-</p:sld>
-</file>
-
-<file path=ppt/slides/slide13.xml><?xml version="1.0" encoding="utf-8"?>
-<p:sld xmlns:a="http://schemas.openxmlformats.org/drawingml/2006/main" xmlns:r="http://schemas.openxmlformats.org/officeDocument/2006/relationships" xmlns:p="http://schemas.openxmlformats.org/presentationml/2006/main">
-  <p:cSld>
-    <p:spTree>
-      <p:nvGrpSpPr>
-        <p:cNvPr id="1" name=""/>
-        <p:cNvGrpSpPr/>
-        <p:nvPr/>
-      </p:nvGrpSpPr>
-      <p:grpSpPr>
-        <a:xfrm>
-          <a:off x="0" y="0"/>
-          <a:ext cx="0" cy="0"/>
-          <a:chOff x="0" y="0"/>
-          <a:chExt cx="0" cy="0"/>
-        </a:xfrm>
-      </p:grpSpPr>
-      <p:sp>
-        <p:nvSpPr>
-          <p:cNvPr id="2" name="Title 1"/>
-          <p:cNvSpPr>
-            <a:spLocks noGrp="1"/>
-          </p:cNvSpPr>
-          <p:nvPr>
-            <p:ph type="title"/>
-          </p:nvPr>
-        </p:nvSpPr>
-        <p:spPr/>
-        <p:txBody>
-          <a:bodyPr/>
-          <a:lstStyle/>
-          <a:p>
-            <a:r>
-              <a:rPr lang="en-US" dirty="0"/>
               <a:t>Models</a:t>
             </a:r>
+            <a:endParaRPr lang="en-US" dirty="0"/>
           </a:p>
         </p:txBody>
       </p:sp>
@@ -6681,7 +6780,7 @@
 </p:sld>
 </file>
 
-<file path=ppt/slides/slide14.xml><?xml version="1.0" encoding="utf-8"?>
+<file path=ppt/slides/slide13.xml><?xml version="1.0" encoding="utf-8"?>
 <p:sld xmlns:a="http://schemas.openxmlformats.org/drawingml/2006/main" xmlns:r="http://schemas.openxmlformats.org/officeDocument/2006/relationships" xmlns:p="http://schemas.openxmlformats.org/presentationml/2006/main">
   <p:cSld>
     <p:spTree>
@@ -6873,7 +6972,7 @@
 </p:sld>
 </file>
 
-<file path=ppt/slides/slide15.xml><?xml version="1.0" encoding="utf-8"?>
+<file path=ppt/slides/slide14.xml><?xml version="1.0" encoding="utf-8"?>
 <p:sld xmlns:a="http://schemas.openxmlformats.org/drawingml/2006/main" xmlns:r="http://schemas.openxmlformats.org/officeDocument/2006/relationships" xmlns:p="http://schemas.openxmlformats.org/presentationml/2006/main">
   <p:cSld>
     <p:spTree>
@@ -6954,7 +7053,7 @@
 </p:sld>
 </file>
 
-<file path=ppt/slides/slide16.xml><?xml version="1.0" encoding="utf-8"?>
+<file path=ppt/slides/slide15.xml><?xml version="1.0" encoding="utf-8"?>
 <p:sld xmlns:a="http://schemas.openxmlformats.org/drawingml/2006/main" xmlns:r="http://schemas.openxmlformats.org/officeDocument/2006/relationships" xmlns:p="http://schemas.openxmlformats.org/presentationml/2006/main">
   <p:cSld>
     <p:spTree>
@@ -7060,7 +7159,7 @@
 </p:sld>
 </file>
 
-<file path=ppt/slides/slide17.xml><?xml version="1.0" encoding="utf-8"?>
+<file path=ppt/slides/slide16.xml><?xml version="1.0" encoding="utf-8"?>
 <p:sld xmlns:a="http://schemas.openxmlformats.org/drawingml/2006/main" xmlns:r="http://schemas.openxmlformats.org/officeDocument/2006/relationships" xmlns:p="http://schemas.openxmlformats.org/presentationml/2006/main">
   <p:cSld>
     <p:spTree>
@@ -7154,7 +7253,7 @@
 </p:sld>
 </file>
 
-<file path=ppt/slides/slide18.xml><?xml version="1.0" encoding="utf-8"?>
+<file path=ppt/slides/slide17.xml><?xml version="1.0" encoding="utf-8"?>
 <p:sld xmlns:a="http://schemas.openxmlformats.org/drawingml/2006/main" xmlns:r="http://schemas.openxmlformats.org/officeDocument/2006/relationships" xmlns:p="http://schemas.openxmlformats.org/presentationml/2006/main">
   <p:cSld>
     <p:spTree>
@@ -7308,7 +7407,7 @@
 </p:sld>
 </file>
 
-<file path=ppt/slides/slide19.xml><?xml version="1.0" encoding="utf-8"?>
+<file path=ppt/slides/slide18.xml><?xml version="1.0" encoding="utf-8"?>
 <p:sld xmlns:a="http://schemas.openxmlformats.org/drawingml/2006/main" xmlns:r="http://schemas.openxmlformats.org/officeDocument/2006/relationships" xmlns:p="http://schemas.openxmlformats.org/presentationml/2006/main">
   <p:cSld>
     <p:spTree>
@@ -7327,7 +7426,7 @@
       </p:grpSpPr>
       <p:sp>
         <p:nvSpPr>
-          <p:cNvPr id="2" name="Title 1"/>
+          <p:cNvPr id="4" name="Title 3"/>
           <p:cNvSpPr>
             <a:spLocks noGrp="1"/>
           </p:cNvSpPr>
@@ -7335,77 +7434,118 @@
             <p:ph type="title"/>
           </p:nvPr>
         </p:nvSpPr>
-        <p:spPr>
-          <a:xfrm>
-            <a:off x="838200" y="2242801"/>
-            <a:ext cx="10515600" cy="1325563"/>
-          </a:xfrm>
-        </p:spPr>
+        <p:spPr/>
         <p:txBody>
-          <a:bodyPr>
-            <a:normAutofit/>
-          </a:bodyPr>
+          <a:bodyPr/>
           <a:lstStyle/>
           <a:p>
-            <a:pPr algn="ctr"/>
             <a:r>
-              <a:rPr lang="en-US" sz="6000" smtClean="0"/>
-              <a:t>Wrapping it Up</a:t>
+              <a:rPr lang="en-US" dirty="0" smtClean="0"/>
+              <a:t>Party Disparity</a:t>
             </a:r>
-            <a:endParaRPr lang="en-US" sz="6000" dirty="0"/>
+            <a:endParaRPr lang="en-US" dirty="0"/>
           </a:p>
         </p:txBody>
       </p:sp>
-      <p:sp>
-        <p:nvSpPr>
-          <p:cNvPr id="3" name="Content Placeholder 2"/>
-          <p:cNvSpPr>
-            <a:spLocks noGrp="1"/>
-          </p:cNvSpPr>
+      <p:pic>
+        <p:nvPicPr>
+          <p:cNvPr id="6" name="Content Placeholder 5"/>
+          <p:cNvPicPr>
+            <a:picLocks noGrp="1" noChangeAspect="1"/>
+          </p:cNvPicPr>
           <p:nvPr>
             <p:ph idx="1"/>
           </p:nvPr>
-        </p:nvSpPr>
+        </p:nvPicPr>
+        <p:blipFill>
+          <a:blip r:embed="rId2" cstate="print">
+            <a:extLst>
+              <a:ext uri="{28A0092B-C50C-407E-A947-70E740481C1C}">
+                <a14:useLocalDpi xmlns:a14="http://schemas.microsoft.com/office/drawing/2010/main" val="0"/>
+              </a:ext>
+            </a:extLst>
+          </a:blip>
+          <a:stretch>
+            <a:fillRect/>
+          </a:stretch>
+        </p:blipFill>
         <p:spPr>
           <a:xfrm>
-            <a:off x="838200" y="3568364"/>
-            <a:ext cx="10515600" cy="2875467"/>
+            <a:off x="2780700" y="1592283"/>
+            <a:ext cx="6630599" cy="4703581"/>
           </a:xfrm>
         </p:spPr>
-        <p:txBody>
-          <a:bodyPr>
-            <a:normAutofit/>
-          </a:bodyPr>
-          <a:lstStyle/>
-          <a:p>
-            <a:pPr marL="0" indent="0" algn="ctr">
-              <a:buNone/>
-            </a:pPr>
-            <a:r>
-              <a:rPr lang="en-US" sz="2400" dirty="0" smtClean="0"/>
-              <a:t>What has been the key things we have been able to conclude?</a:t>
-            </a:r>
-            <a:endParaRPr lang="en-US" sz="2400" dirty="0"/>
-          </a:p>
-        </p:txBody>
-      </p:sp>
+      </p:pic>
     </p:spTree>
     <p:extLst>
       <p:ext uri="{BB962C8B-B14F-4D97-AF65-F5344CB8AC3E}">
-        <p14:creationId xmlns:p14="http://schemas.microsoft.com/office/powerpoint/2010/main" val="1564322208"/>
+        <p14:creationId xmlns:p14="http://schemas.microsoft.com/office/powerpoint/2010/main" val="1626842985"/>
       </p:ext>
     </p:extLst>
   </p:cSld>
   <p:clrMapOvr>
     <a:masterClrMapping/>
   </p:clrMapOvr>
-  <p:timing>
-    <p:tnLst>
-      <p:par>
-        <p:cTn id="1" dur="indefinite" restart="never" nodeType="tmRoot"/>
-      </p:par>
-    </p:tnLst>
-  </p:timing>
+</p:sld>
+</file>
+
+<file path=ppt/slides/slide19.xml><?xml version="1.0" encoding="utf-8"?>
+<p:sld xmlns:a="http://schemas.openxmlformats.org/drawingml/2006/main" xmlns:r="http://schemas.openxmlformats.org/officeDocument/2006/relationships" xmlns:p="http://schemas.openxmlformats.org/presentationml/2006/main">
+  <p:cSld>
+    <p:spTree>
+      <p:nvGrpSpPr>
+        <p:cNvPr id="1" name=""/>
+        <p:cNvGrpSpPr/>
+        <p:nvPr/>
+      </p:nvGrpSpPr>
+      <p:grpSpPr>
+        <a:xfrm>
+          <a:off x="0" y="0"/>
+          <a:ext cx="0" cy="0"/>
+          <a:chOff x="0" y="0"/>
+          <a:chExt cx="0" cy="0"/>
+        </a:xfrm>
+      </p:grpSpPr>
+      <p:pic>
+        <p:nvPicPr>
+          <p:cNvPr id="4" name="Picture 3"/>
+          <p:cNvPicPr>
+            <a:picLocks noChangeAspect="1"/>
+          </p:cNvPicPr>
+          <p:nvPr/>
+        </p:nvPicPr>
+        <p:blipFill>
+          <a:blip r:embed="rId2">
+            <a:extLst>
+              <a:ext uri="{28A0092B-C50C-407E-A947-70E740481C1C}">
+                <a14:useLocalDpi xmlns:a14="http://schemas.microsoft.com/office/drawing/2010/main" val="0"/>
+              </a:ext>
+            </a:extLst>
+          </a:blip>
+          <a:stretch>
+            <a:fillRect/>
+          </a:stretch>
+        </p:blipFill>
+        <p:spPr>
+          <a:xfrm>
+            <a:off x="2596431" y="1382486"/>
+            <a:ext cx="7042869" cy="4084864"/>
+          </a:xfrm>
+          <a:prstGeom prst="rect">
+            <a:avLst/>
+          </a:prstGeom>
+        </p:spPr>
+      </p:pic>
+    </p:spTree>
+    <p:extLst>
+      <p:ext uri="{BB962C8B-B14F-4D97-AF65-F5344CB8AC3E}">
+        <p14:creationId xmlns:p14="http://schemas.microsoft.com/office/powerpoint/2010/main" val="588255291"/>
+      </p:ext>
+    </p:extLst>
+  </p:cSld>
+  <p:clrMapOvr>
+    <a:masterClrMapping/>
+  </p:clrMapOvr>
 </p:sld>
 </file>
 
@@ -7570,457 +7710,46 @@
           <a:chExt cx="0" cy="0"/>
         </a:xfrm>
       </p:grpSpPr>
-      <p:sp>
-        <p:nvSpPr>
-          <p:cNvPr id="2" name="Title 1"/>
-          <p:cNvSpPr>
-            <a:spLocks noGrp="1"/>
-          </p:cNvSpPr>
-          <p:nvPr>
-            <p:ph type="title"/>
-          </p:nvPr>
-        </p:nvSpPr>
-        <p:spPr/>
-        <p:txBody>
-          <a:bodyPr/>
-          <a:lstStyle/>
-          <a:p>
-            <a:r>
-              <a:rPr lang="en-US" dirty="0" smtClean="0"/>
-              <a:t>The evolution of our Question</a:t>
-            </a:r>
-            <a:endParaRPr lang="en-US" dirty="0"/>
-          </a:p>
-        </p:txBody>
-      </p:sp>
-      <p:sp>
-        <p:nvSpPr>
-          <p:cNvPr id="3" name="Content Placeholder 2"/>
-          <p:cNvSpPr>
-            <a:spLocks noGrp="1"/>
-          </p:cNvSpPr>
-          <p:nvPr>
-            <p:ph idx="1"/>
-          </p:nvPr>
-        </p:nvSpPr>
-        <p:spPr/>
-        <p:txBody>
-          <a:bodyPr/>
-          <a:lstStyle/>
-          <a:p>
-            <a:pPr lvl="1"/>
-            <a:r>
-              <a:rPr lang="en-US" dirty="0" smtClean="0"/>
-              <a:t>At First we wanted to know:</a:t>
-            </a:r>
-          </a:p>
-          <a:p>
-            <a:pPr lvl="2"/>
-            <a:r>
-              <a:rPr lang="en-US" dirty="0" smtClean="0"/>
-              <a:t>Do Political Contributes  by sectors affect whether candidates win?</a:t>
-            </a:r>
-          </a:p>
-          <a:p>
-            <a:pPr lvl="2"/>
-            <a:r>
-              <a:rPr lang="en-US" dirty="0" smtClean="0"/>
-              <a:t>Do election </a:t>
-            </a:r>
-            <a:r>
-              <a:rPr lang="en-US" dirty="0"/>
-              <a:t>results had any specific impact on the market as a whole</a:t>
-            </a:r>
-            <a:r>
-              <a:rPr lang="en-US" dirty="0" smtClean="0"/>
-              <a:t>.?</a:t>
-            </a:r>
-            <a:endParaRPr lang="en-US" dirty="0"/>
-          </a:p>
-          <a:p>
-            <a:pPr lvl="1"/>
-            <a:endParaRPr lang="en-US" dirty="0"/>
-          </a:p>
-          <a:p>
-            <a:pPr lvl="1"/>
-            <a:r>
-              <a:rPr lang="en-US" dirty="0" smtClean="0"/>
-              <a:t>After Part 2</a:t>
-            </a:r>
-          </a:p>
-          <a:p>
-            <a:pPr lvl="2"/>
-            <a:r>
-              <a:rPr lang="en-US" dirty="0" smtClean="0"/>
-              <a:t>The idea morphed into looking at total campaign contributions </a:t>
-            </a:r>
-          </a:p>
-          <a:p>
-            <a:pPr lvl="2"/>
-            <a:r>
-              <a:rPr lang="en-US" dirty="0" smtClean="0"/>
-              <a:t>Due to uncovering very little with respect to stock changes and voting shifts </a:t>
-            </a:r>
-          </a:p>
-          <a:p>
-            <a:pPr lvl="3"/>
-            <a:r>
-              <a:rPr lang="en-US" dirty="0" smtClean="0"/>
-              <a:t>An interesting paradox is the Financial Crisis</a:t>
-            </a:r>
-          </a:p>
-        </p:txBody>
-      </p:sp>
+      <p:pic>
+        <p:nvPicPr>
+          <p:cNvPr id="2" name="Picture 1"/>
+          <p:cNvPicPr>
+            <a:picLocks noChangeAspect="1"/>
+          </p:cNvPicPr>
+          <p:nvPr/>
+        </p:nvPicPr>
+        <p:blipFill>
+          <a:blip r:embed="rId2">
+            <a:extLst>
+              <a:ext uri="{28A0092B-C50C-407E-A947-70E740481C1C}">
+                <a14:useLocalDpi xmlns:a14="http://schemas.microsoft.com/office/drawing/2010/main" val="0"/>
+              </a:ext>
+            </a:extLst>
+          </a:blip>
+          <a:stretch>
+            <a:fillRect/>
+          </a:stretch>
+        </p:blipFill>
+        <p:spPr>
+          <a:xfrm>
+            <a:off x="2519362" y="1652587"/>
+            <a:ext cx="7153275" cy="3552825"/>
+          </a:xfrm>
+          <a:prstGeom prst="rect">
+            <a:avLst/>
+          </a:prstGeom>
+        </p:spPr>
+      </p:pic>
     </p:spTree>
     <p:extLst>
       <p:ext uri="{BB962C8B-B14F-4D97-AF65-F5344CB8AC3E}">
-        <p14:creationId xmlns:p14="http://schemas.microsoft.com/office/powerpoint/2010/main" val="394179291"/>
+        <p14:creationId xmlns:p14="http://schemas.microsoft.com/office/powerpoint/2010/main" val="1939448696"/>
       </p:ext>
     </p:extLst>
   </p:cSld>
   <p:clrMapOvr>
     <a:masterClrMapping/>
   </p:clrMapOvr>
-  <p:transition spd="slow">
-    <p:push dir="u"/>
-  </p:transition>
-  <p:timing>
-    <p:tnLst>
-      <p:par>
-        <p:cTn id="1" dur="indefinite" restart="never" nodeType="tmRoot">
-          <p:childTnLst>
-            <p:seq concurrent="1" nextAc="seek">
-              <p:cTn id="2" dur="indefinite" nodeType="mainSeq">
-                <p:childTnLst>
-                  <p:par>
-                    <p:cTn id="3" fill="hold">
-                      <p:stCondLst>
-                        <p:cond delay="indefinite"/>
-                      </p:stCondLst>
-                      <p:childTnLst>
-                        <p:par>
-                          <p:cTn id="4" fill="hold">
-                            <p:stCondLst>
-                              <p:cond delay="0"/>
-                            </p:stCondLst>
-                            <p:childTnLst>
-                              <p:par>
-                                <p:cTn id="5" presetID="1" presetClass="entr" presetSubtype="0" fill="hold" nodeType="clickEffect">
-                                  <p:stCondLst>
-                                    <p:cond delay="0"/>
-                                  </p:stCondLst>
-                                  <p:childTnLst>
-                                    <p:set>
-                                      <p:cBhvr>
-                                        <p:cTn id="6" dur="1" fill="hold">
-                                          <p:stCondLst>
-                                            <p:cond delay="0"/>
-                                          </p:stCondLst>
-                                        </p:cTn>
-                                        <p:tgtEl>
-                                          <p:spTgt spid="3">
-                                            <p:txEl>
-                                              <p:pRg st="0" end="0"/>
-                                            </p:txEl>
-                                          </p:spTgt>
-                                        </p:tgtEl>
-                                        <p:attrNameLst>
-                                          <p:attrName>style.visibility</p:attrName>
-                                        </p:attrNameLst>
-                                      </p:cBhvr>
-                                      <p:to>
-                                        <p:strVal val="visible"/>
-                                      </p:to>
-                                    </p:set>
-                                  </p:childTnLst>
-                                </p:cTn>
-                              </p:par>
-                            </p:childTnLst>
-                          </p:cTn>
-                        </p:par>
-                      </p:childTnLst>
-                    </p:cTn>
-                  </p:par>
-                  <p:par>
-                    <p:cTn id="7" fill="hold">
-                      <p:stCondLst>
-                        <p:cond delay="indefinite"/>
-                      </p:stCondLst>
-                      <p:childTnLst>
-                        <p:par>
-                          <p:cTn id="8" fill="hold">
-                            <p:stCondLst>
-                              <p:cond delay="0"/>
-                            </p:stCondLst>
-                            <p:childTnLst>
-                              <p:par>
-                                <p:cTn id="9" presetID="1" presetClass="entr" presetSubtype="0" fill="hold" nodeType="clickEffect">
-                                  <p:stCondLst>
-                                    <p:cond delay="0"/>
-                                  </p:stCondLst>
-                                  <p:childTnLst>
-                                    <p:set>
-                                      <p:cBhvr>
-                                        <p:cTn id="10" dur="1" fill="hold">
-                                          <p:stCondLst>
-                                            <p:cond delay="0"/>
-                                          </p:stCondLst>
-                                        </p:cTn>
-                                        <p:tgtEl>
-                                          <p:spTgt spid="3">
-                                            <p:txEl>
-                                              <p:pRg st="1" end="1"/>
-                                            </p:txEl>
-                                          </p:spTgt>
-                                        </p:tgtEl>
-                                        <p:attrNameLst>
-                                          <p:attrName>style.visibility</p:attrName>
-                                        </p:attrNameLst>
-                                      </p:cBhvr>
-                                      <p:to>
-                                        <p:strVal val="visible"/>
-                                      </p:to>
-                                    </p:set>
-                                  </p:childTnLst>
-                                </p:cTn>
-                              </p:par>
-                              <p:par>
-                                <p:cTn id="11" presetID="1" presetClass="entr" presetSubtype="0" fill="hold" nodeType="withEffect">
-                                  <p:stCondLst>
-                                    <p:cond delay="0"/>
-                                  </p:stCondLst>
-                                  <p:childTnLst>
-                                    <p:set>
-                                      <p:cBhvr>
-                                        <p:cTn id="12" dur="1" fill="hold">
-                                          <p:stCondLst>
-                                            <p:cond delay="0"/>
-                                          </p:stCondLst>
-                                        </p:cTn>
-                                        <p:tgtEl>
-                                          <p:spTgt spid="3">
-                                            <p:txEl>
-                                              <p:pRg st="2" end="2"/>
-                                            </p:txEl>
-                                          </p:spTgt>
-                                        </p:tgtEl>
-                                        <p:attrNameLst>
-                                          <p:attrName>style.visibility</p:attrName>
-                                        </p:attrNameLst>
-                                      </p:cBhvr>
-                                      <p:to>
-                                        <p:strVal val="visible"/>
-                                      </p:to>
-                                    </p:set>
-                                  </p:childTnLst>
-                                </p:cTn>
-                              </p:par>
-                            </p:childTnLst>
-                          </p:cTn>
-                        </p:par>
-                      </p:childTnLst>
-                    </p:cTn>
-                  </p:par>
-                  <p:par>
-                    <p:cTn id="13" fill="hold">
-                      <p:stCondLst>
-                        <p:cond delay="indefinite"/>
-                      </p:stCondLst>
-                      <p:childTnLst>
-                        <p:par>
-                          <p:cTn id="14" fill="hold">
-                            <p:stCondLst>
-                              <p:cond delay="0"/>
-                            </p:stCondLst>
-                            <p:childTnLst>
-                              <p:par>
-                                <p:cTn id="15" presetID="1" presetClass="entr" presetSubtype="0" fill="hold" nodeType="clickEffect">
-                                  <p:stCondLst>
-                                    <p:cond delay="0"/>
-                                  </p:stCondLst>
-                                  <p:childTnLst>
-                                    <p:set>
-                                      <p:cBhvr>
-                                        <p:cTn id="16" dur="1" fill="hold">
-                                          <p:stCondLst>
-                                            <p:cond delay="0"/>
-                                          </p:stCondLst>
-                                        </p:cTn>
-                                        <p:tgtEl>
-                                          <p:spTgt spid="3">
-                                            <p:txEl>
-                                              <p:pRg st="4" end="4"/>
-                                            </p:txEl>
-                                          </p:spTgt>
-                                        </p:tgtEl>
-                                        <p:attrNameLst>
-                                          <p:attrName>style.visibility</p:attrName>
-                                        </p:attrNameLst>
-                                      </p:cBhvr>
-                                      <p:to>
-                                        <p:strVal val="visible"/>
-                                      </p:to>
-                                    </p:set>
-                                  </p:childTnLst>
-                                </p:cTn>
-                              </p:par>
-                            </p:childTnLst>
-                          </p:cTn>
-                        </p:par>
-                      </p:childTnLst>
-                    </p:cTn>
-                  </p:par>
-                  <p:par>
-                    <p:cTn id="17" fill="hold">
-                      <p:stCondLst>
-                        <p:cond delay="indefinite"/>
-                      </p:stCondLst>
-                      <p:childTnLst>
-                        <p:par>
-                          <p:cTn id="18" fill="hold">
-                            <p:stCondLst>
-                              <p:cond delay="0"/>
-                            </p:stCondLst>
-                            <p:childTnLst>
-                              <p:par>
-                                <p:cTn id="19" presetID="1" presetClass="entr" presetSubtype="0" fill="hold" nodeType="clickEffect">
-                                  <p:stCondLst>
-                                    <p:cond delay="0"/>
-                                  </p:stCondLst>
-                                  <p:childTnLst>
-                                    <p:set>
-                                      <p:cBhvr>
-                                        <p:cTn id="20" dur="1" fill="hold">
-                                          <p:stCondLst>
-                                            <p:cond delay="0"/>
-                                          </p:stCondLst>
-                                        </p:cTn>
-                                        <p:tgtEl>
-                                          <p:spTgt spid="3">
-                                            <p:txEl>
-                                              <p:pRg st="5" end="5"/>
-                                            </p:txEl>
-                                          </p:spTgt>
-                                        </p:tgtEl>
-                                        <p:attrNameLst>
-                                          <p:attrName>style.visibility</p:attrName>
-                                        </p:attrNameLst>
-                                      </p:cBhvr>
-                                      <p:to>
-                                        <p:strVal val="visible"/>
-                                      </p:to>
-                                    </p:set>
-                                  </p:childTnLst>
-                                </p:cTn>
-                              </p:par>
-                              <p:par>
-                                <p:cTn id="21" presetID="1" presetClass="entr" presetSubtype="0" fill="hold" nodeType="withEffect">
-                                  <p:stCondLst>
-                                    <p:cond delay="0"/>
-                                  </p:stCondLst>
-                                  <p:childTnLst>
-                                    <p:set>
-                                      <p:cBhvr>
-                                        <p:cTn id="22" dur="1" fill="hold">
-                                          <p:stCondLst>
-                                            <p:cond delay="0"/>
-                                          </p:stCondLst>
-                                        </p:cTn>
-                                        <p:tgtEl>
-                                          <p:spTgt spid="3">
-                                            <p:txEl>
-                                              <p:pRg st="6" end="6"/>
-                                            </p:txEl>
-                                          </p:spTgt>
-                                        </p:tgtEl>
-                                        <p:attrNameLst>
-                                          <p:attrName>style.visibility</p:attrName>
-                                        </p:attrNameLst>
-                                      </p:cBhvr>
-                                      <p:to>
-                                        <p:strVal val="visible"/>
-                                      </p:to>
-                                    </p:set>
-                                  </p:childTnLst>
-                                </p:cTn>
-                              </p:par>
-                            </p:childTnLst>
-                          </p:cTn>
-                        </p:par>
-                      </p:childTnLst>
-                    </p:cTn>
-                  </p:par>
-                  <p:par>
-                    <p:cTn id="23" fill="hold">
-                      <p:stCondLst>
-                        <p:cond delay="indefinite"/>
-                      </p:stCondLst>
-                      <p:childTnLst>
-                        <p:par>
-                          <p:cTn id="24" fill="hold">
-                            <p:stCondLst>
-                              <p:cond delay="0"/>
-                            </p:stCondLst>
-                            <p:childTnLst>
-                              <p:par>
-                                <p:cTn id="25" presetID="1" presetClass="entr" presetSubtype="0" fill="hold" nodeType="clickEffect">
-                                  <p:stCondLst>
-                                    <p:cond delay="0"/>
-                                  </p:stCondLst>
-                                  <p:childTnLst>
-                                    <p:set>
-                                      <p:cBhvr>
-                                        <p:cTn id="26" dur="1" fill="hold">
-                                          <p:stCondLst>
-                                            <p:cond delay="0"/>
-                                          </p:stCondLst>
-                                        </p:cTn>
-                                        <p:tgtEl>
-                                          <p:spTgt spid="3">
-                                            <p:txEl>
-                                              <p:pRg st="7" end="7"/>
-                                            </p:txEl>
-                                          </p:spTgt>
-                                        </p:tgtEl>
-                                        <p:attrNameLst>
-                                          <p:attrName>style.visibility</p:attrName>
-                                        </p:attrNameLst>
-                                      </p:cBhvr>
-                                      <p:to>
-                                        <p:strVal val="visible"/>
-                                      </p:to>
-                                    </p:set>
-                                  </p:childTnLst>
-                                </p:cTn>
-                              </p:par>
-                            </p:childTnLst>
-                          </p:cTn>
-                        </p:par>
-                      </p:childTnLst>
-                    </p:cTn>
-                  </p:par>
-                </p:childTnLst>
-              </p:cTn>
-              <p:prevCondLst>
-                <p:cond evt="onPrev" delay="0">
-                  <p:tgtEl>
-                    <p:sldTgt/>
-                  </p:tgtEl>
-                </p:cond>
-              </p:prevCondLst>
-              <p:nextCondLst>
-                <p:cond evt="onNext" delay="0">
-                  <p:tgtEl>
-                    <p:sldTgt/>
-                  </p:tgtEl>
-                </p:cond>
-              </p:nextCondLst>
-            </p:seq>
-          </p:childTnLst>
-        </p:cTn>
-      </p:par>
-    </p:tnLst>
-  </p:timing>
 </p:sld>
 </file>
 
@@ -8041,257 +7770,140 @@
           <a:chExt cx="0" cy="0"/>
         </a:xfrm>
       </p:grpSpPr>
-      <p:sp>
-        <p:nvSpPr>
-          <p:cNvPr id="2" name="Title 1"/>
-          <p:cNvSpPr>
-            <a:spLocks noGrp="1"/>
-          </p:cNvSpPr>
-          <p:nvPr>
-            <p:ph type="title"/>
-          </p:nvPr>
-        </p:nvSpPr>
-        <p:spPr/>
-        <p:txBody>
-          <a:bodyPr/>
-          <a:lstStyle/>
-          <a:p>
-            <a:r>
-              <a:rPr lang="en-US" dirty="0" smtClean="0"/>
-              <a:t>Some takeaways</a:t>
-            </a:r>
-            <a:endParaRPr lang="en-US" dirty="0"/>
-          </a:p>
-        </p:txBody>
-      </p:sp>
-      <p:sp>
-        <p:nvSpPr>
-          <p:cNvPr id="3" name="Content Placeholder 2"/>
-          <p:cNvSpPr>
-            <a:spLocks noGrp="1"/>
-          </p:cNvSpPr>
-          <p:nvPr>
-            <p:ph idx="1"/>
-          </p:nvPr>
-        </p:nvSpPr>
-        <p:spPr/>
-        <p:txBody>
-          <a:bodyPr/>
-          <a:lstStyle/>
-          <a:p>
-            <a:r>
-              <a:rPr lang="en-US" dirty="0" smtClean="0"/>
-              <a:t>Many of our conclusions supported already expected conclusions, but no major breakthroughs that we we were hopping for</a:t>
-            </a:r>
-          </a:p>
-          <a:p>
-            <a:r>
-              <a:rPr lang="en-US" dirty="0" smtClean="0"/>
-              <a:t>Stocks aren’t significantly affected by election results</a:t>
-            </a:r>
-          </a:p>
-          <a:p>
-            <a:r>
-              <a:rPr lang="en-US" dirty="0"/>
-              <a:t>If you’re running for congress, make sure to be an incumbent</a:t>
-            </a:r>
-          </a:p>
-          <a:p>
-            <a:endParaRPr lang="en-US" dirty="0"/>
-          </a:p>
-        </p:txBody>
-      </p:sp>
+      <p:pic>
+        <p:nvPicPr>
+          <p:cNvPr id="2" name="Picture 1"/>
+          <p:cNvPicPr>
+            <a:picLocks noChangeAspect="1"/>
+          </p:cNvPicPr>
+          <p:nvPr/>
+        </p:nvPicPr>
+        <p:blipFill>
+          <a:blip r:embed="rId2">
+            <a:extLst>
+              <a:ext uri="{28A0092B-C50C-407E-A947-70E740481C1C}">
+                <a14:useLocalDpi xmlns:a14="http://schemas.microsoft.com/office/drawing/2010/main" val="0"/>
+              </a:ext>
+            </a:extLst>
+          </a:blip>
+          <a:stretch>
+            <a:fillRect/>
+          </a:stretch>
+        </p:blipFill>
+        <p:spPr>
+          <a:xfrm>
+            <a:off x="2519362" y="1652587"/>
+            <a:ext cx="7153275" cy="3552825"/>
+          </a:xfrm>
+          <a:prstGeom prst="rect">
+            <a:avLst/>
+          </a:prstGeom>
+        </p:spPr>
+      </p:pic>
     </p:spTree>
     <p:extLst>
       <p:ext uri="{BB962C8B-B14F-4D97-AF65-F5344CB8AC3E}">
-        <p14:creationId xmlns:p14="http://schemas.microsoft.com/office/powerpoint/2010/main" val="2131776489"/>
+        <p14:creationId xmlns:p14="http://schemas.microsoft.com/office/powerpoint/2010/main" val="1807439506"/>
       </p:ext>
     </p:extLst>
   </p:cSld>
   <p:clrMapOvr>
     <a:masterClrMapping/>
   </p:clrMapOvr>
-  <p:timing>
-    <p:tnLst>
-      <p:par>
-        <p:cTn id="1" dur="indefinite" restart="never" nodeType="tmRoot">
-          <p:childTnLst>
-            <p:seq concurrent="1" nextAc="seek">
-              <p:cTn id="2" dur="indefinite" nodeType="mainSeq">
-                <p:childTnLst>
-                  <p:par>
-                    <p:cTn id="3" fill="hold">
-                      <p:stCondLst>
-                        <p:cond delay="indefinite"/>
-                      </p:stCondLst>
-                      <p:childTnLst>
-                        <p:par>
-                          <p:cTn id="4" fill="hold">
-                            <p:stCondLst>
-                              <p:cond delay="0"/>
-                            </p:stCondLst>
-                            <p:childTnLst>
-                              <p:par>
-                                <p:cTn id="5" presetID="1" presetClass="entr" presetSubtype="0" fill="hold" nodeType="clickEffect">
-                                  <p:stCondLst>
-                                    <p:cond delay="0"/>
-                                  </p:stCondLst>
-                                  <p:childTnLst>
-                                    <p:set>
-                                      <p:cBhvr>
-                                        <p:cTn id="6" dur="1" fill="hold">
-                                          <p:stCondLst>
-                                            <p:cond delay="0"/>
-                                          </p:stCondLst>
-                                        </p:cTn>
-                                        <p:tgtEl>
-                                          <p:spTgt spid="3">
-                                            <p:txEl>
-                                              <p:pRg st="0" end="0"/>
-                                            </p:txEl>
-                                          </p:spTgt>
-                                        </p:tgtEl>
-                                        <p:attrNameLst>
-                                          <p:attrName>style.visibility</p:attrName>
-                                        </p:attrNameLst>
-                                      </p:cBhvr>
-                                      <p:to>
-                                        <p:strVal val="visible"/>
-                                      </p:to>
-                                    </p:set>
-                                  </p:childTnLst>
-                                </p:cTn>
-                              </p:par>
-                            </p:childTnLst>
-                          </p:cTn>
-                        </p:par>
-                      </p:childTnLst>
-                    </p:cTn>
-                  </p:par>
-                  <p:par>
-                    <p:cTn id="7" fill="hold">
-                      <p:stCondLst>
-                        <p:cond delay="indefinite"/>
-                      </p:stCondLst>
-                      <p:childTnLst>
-                        <p:par>
-                          <p:cTn id="8" fill="hold">
-                            <p:stCondLst>
-                              <p:cond delay="0"/>
-                            </p:stCondLst>
-                            <p:childTnLst>
-                              <p:par>
-                                <p:cTn id="9" presetID="1" presetClass="entr" presetSubtype="0" fill="hold" nodeType="clickEffect">
-                                  <p:stCondLst>
-                                    <p:cond delay="0"/>
-                                  </p:stCondLst>
-                                  <p:childTnLst>
-                                    <p:set>
-                                      <p:cBhvr>
-                                        <p:cTn id="10" dur="1" fill="hold">
-                                          <p:stCondLst>
-                                            <p:cond delay="0"/>
-                                          </p:stCondLst>
-                                        </p:cTn>
-                                        <p:tgtEl>
-                                          <p:spTgt spid="3">
-                                            <p:txEl>
-                                              <p:pRg st="1" end="1"/>
-                                            </p:txEl>
-                                          </p:spTgt>
-                                        </p:tgtEl>
-                                        <p:attrNameLst>
-                                          <p:attrName>style.visibility</p:attrName>
-                                        </p:attrNameLst>
-                                      </p:cBhvr>
-                                      <p:to>
-                                        <p:strVal val="visible"/>
-                                      </p:to>
-                                    </p:set>
-                                  </p:childTnLst>
-                                </p:cTn>
-                              </p:par>
-                            </p:childTnLst>
-                          </p:cTn>
-                        </p:par>
-                      </p:childTnLst>
-                    </p:cTn>
-                  </p:par>
-                  <p:par>
-                    <p:cTn id="11" fill="hold">
-                      <p:stCondLst>
-                        <p:cond delay="indefinite"/>
-                      </p:stCondLst>
-                      <p:childTnLst>
-                        <p:par>
-                          <p:cTn id="12" fill="hold">
-                            <p:stCondLst>
-                              <p:cond delay="0"/>
-                            </p:stCondLst>
-                            <p:childTnLst>
-                              <p:par>
-                                <p:cTn id="13" presetID="1" presetClass="entr" presetSubtype="0" fill="hold" nodeType="clickEffect">
-                                  <p:stCondLst>
-                                    <p:cond delay="0"/>
-                                  </p:stCondLst>
-                                  <p:childTnLst>
-                                    <p:set>
-                                      <p:cBhvr>
-                                        <p:cTn id="14" dur="1" fill="hold">
-                                          <p:stCondLst>
-                                            <p:cond delay="0"/>
-                                          </p:stCondLst>
-                                        </p:cTn>
-                                        <p:tgtEl>
-                                          <p:spTgt spid="3">
-                                            <p:txEl>
-                                              <p:pRg st="2" end="2"/>
-                                            </p:txEl>
-                                          </p:spTgt>
-                                        </p:tgtEl>
-                                        <p:attrNameLst>
-                                          <p:attrName>style.visibility</p:attrName>
-                                        </p:attrNameLst>
-                                      </p:cBhvr>
-                                      <p:to>
-                                        <p:strVal val="visible"/>
-                                      </p:to>
-                                    </p:set>
-                                  </p:childTnLst>
-                                </p:cTn>
-                              </p:par>
-                            </p:childTnLst>
-                          </p:cTn>
-                        </p:par>
-                      </p:childTnLst>
-                    </p:cTn>
-                  </p:par>
-                </p:childTnLst>
-              </p:cTn>
-              <p:prevCondLst>
-                <p:cond evt="onPrev" delay="0">
-                  <p:tgtEl>
-                    <p:sldTgt/>
-                  </p:tgtEl>
-                </p:cond>
-              </p:prevCondLst>
-              <p:nextCondLst>
-                <p:cond evt="onNext" delay="0">
-                  <p:tgtEl>
-                    <p:sldTgt/>
-                  </p:tgtEl>
-                </p:cond>
-              </p:nextCondLst>
-            </p:seq>
-          </p:childTnLst>
-        </p:cTn>
-      </p:par>
-    </p:tnLst>
-  </p:timing>
 </p:sld>
 </file>
 
 <file path=ppt/slides/slide22.xml><?xml version="1.0" encoding="utf-8"?>
+<p:sld xmlns:a="http://schemas.openxmlformats.org/drawingml/2006/main" xmlns:r="http://schemas.openxmlformats.org/officeDocument/2006/relationships" xmlns:p="http://schemas.openxmlformats.org/presentationml/2006/main">
+  <p:cSld>
+    <p:spTree>
+      <p:nvGrpSpPr>
+        <p:cNvPr id="1" name=""/>
+        <p:cNvGrpSpPr/>
+        <p:nvPr/>
+      </p:nvGrpSpPr>
+      <p:grpSpPr>
+        <a:xfrm>
+          <a:off x="0" y="0"/>
+          <a:ext cx="0" cy="0"/>
+          <a:chOff x="0" y="0"/>
+          <a:chExt cx="0" cy="0"/>
+        </a:xfrm>
+      </p:grpSpPr>
+      <p:pic>
+        <p:nvPicPr>
+          <p:cNvPr id="2" name="Picture 1"/>
+          <p:cNvPicPr>
+            <a:picLocks noChangeAspect="1"/>
+          </p:cNvPicPr>
+          <p:nvPr/>
+        </p:nvPicPr>
+        <p:blipFill>
+          <a:blip r:embed="rId2">
+            <a:extLst>
+              <a:ext uri="{28A0092B-C50C-407E-A947-70E740481C1C}">
+                <a14:useLocalDpi xmlns:a14="http://schemas.microsoft.com/office/drawing/2010/main" val="0"/>
+              </a:ext>
+            </a:extLst>
+          </a:blip>
+          <a:stretch>
+            <a:fillRect/>
+          </a:stretch>
+        </p:blipFill>
+        <p:spPr>
+          <a:xfrm>
+            <a:off x="2497589" y="0"/>
+            <a:ext cx="7153275" cy="3552825"/>
+          </a:xfrm>
+          <a:prstGeom prst="rect">
+            <a:avLst/>
+          </a:prstGeom>
+        </p:spPr>
+      </p:pic>
+      <p:pic>
+        <p:nvPicPr>
+          <p:cNvPr id="3" name="Picture 2"/>
+          <p:cNvPicPr>
+            <a:picLocks noChangeAspect="1"/>
+          </p:cNvPicPr>
+          <p:nvPr/>
+        </p:nvPicPr>
+        <p:blipFill>
+          <a:blip r:embed="rId3">
+            <a:extLst>
+              <a:ext uri="{28A0092B-C50C-407E-A947-70E740481C1C}">
+                <a14:useLocalDpi xmlns:a14="http://schemas.microsoft.com/office/drawing/2010/main" val="0"/>
+              </a:ext>
+            </a:extLst>
+          </a:blip>
+          <a:stretch>
+            <a:fillRect/>
+          </a:stretch>
+        </p:blipFill>
+        <p:spPr>
+          <a:xfrm>
+            <a:off x="2497590" y="3391900"/>
+            <a:ext cx="7153275" cy="3552825"/>
+          </a:xfrm>
+          <a:prstGeom prst="rect">
+            <a:avLst/>
+          </a:prstGeom>
+        </p:spPr>
+      </p:pic>
+    </p:spTree>
+    <p:extLst>
+      <p:ext uri="{BB962C8B-B14F-4D97-AF65-F5344CB8AC3E}">
+        <p14:creationId xmlns:p14="http://schemas.microsoft.com/office/powerpoint/2010/main" val="1479590527"/>
+      </p:ext>
+    </p:extLst>
+  </p:cSld>
+  <p:clrMapOvr>
+    <a:masterClrMapping/>
+  </p:clrMapOvr>
+</p:sld>
+</file>
+
+<file path=ppt/slides/slide23.xml><?xml version="1.0" encoding="utf-8"?>
 <p:sld xmlns:a="http://schemas.openxmlformats.org/drawingml/2006/main" xmlns:r="http://schemas.openxmlformats.org/officeDocument/2006/relationships" xmlns:p="http://schemas.openxmlformats.org/presentationml/2006/main">
   <p:cSld>
     <p:spTree>
@@ -8388,7 +8000,7 @@
 </p:sld>
 </file>
 
-<file path=ppt/slides/slide23.xml><?xml version="1.0" encoding="utf-8"?>
+<file path=ppt/slides/slide24.xml><?xml version="1.0" encoding="utf-8"?>
 <p:sld xmlns:a="http://schemas.openxmlformats.org/drawingml/2006/main" xmlns:r="http://schemas.openxmlformats.org/officeDocument/2006/relationships" xmlns:p="http://schemas.openxmlformats.org/presentationml/2006/main">
   <p:cSld>
     <p:spTree>
@@ -8765,6 +8377,908 @@
       </p:par>
     </p:tnLst>
   </p:timing>
+</p:sld>
+</file>
+
+<file path=ppt/slides/slide25.xml><?xml version="1.0" encoding="utf-8"?>
+<p:sld xmlns:a="http://schemas.openxmlformats.org/drawingml/2006/main" xmlns:r="http://schemas.openxmlformats.org/officeDocument/2006/relationships" xmlns:p="http://schemas.openxmlformats.org/presentationml/2006/main">
+  <p:cSld>
+    <p:spTree>
+      <p:nvGrpSpPr>
+        <p:cNvPr id="1" name=""/>
+        <p:cNvGrpSpPr/>
+        <p:nvPr/>
+      </p:nvGrpSpPr>
+      <p:grpSpPr>
+        <a:xfrm>
+          <a:off x="0" y="0"/>
+          <a:ext cx="0" cy="0"/>
+          <a:chOff x="0" y="0"/>
+          <a:chExt cx="0" cy="0"/>
+        </a:xfrm>
+      </p:grpSpPr>
+      <p:sp>
+        <p:nvSpPr>
+          <p:cNvPr id="2" name="Title 1"/>
+          <p:cNvSpPr>
+            <a:spLocks noGrp="1"/>
+          </p:cNvSpPr>
+          <p:nvPr>
+            <p:ph type="title"/>
+          </p:nvPr>
+        </p:nvSpPr>
+        <p:spPr>
+          <a:xfrm>
+            <a:off x="838200" y="2242801"/>
+            <a:ext cx="10515600" cy="1325563"/>
+          </a:xfrm>
+        </p:spPr>
+        <p:txBody>
+          <a:bodyPr>
+            <a:normAutofit/>
+          </a:bodyPr>
+          <a:lstStyle/>
+          <a:p>
+            <a:pPr algn="ctr"/>
+            <a:r>
+              <a:rPr lang="en-US" sz="6000" dirty="0" smtClean="0"/>
+              <a:t>Wrapping it Up</a:t>
+            </a:r>
+            <a:endParaRPr lang="en-US" sz="6000" dirty="0"/>
+          </a:p>
+        </p:txBody>
+      </p:sp>
+      <p:sp>
+        <p:nvSpPr>
+          <p:cNvPr id="3" name="Content Placeholder 2"/>
+          <p:cNvSpPr>
+            <a:spLocks noGrp="1"/>
+          </p:cNvSpPr>
+          <p:nvPr>
+            <p:ph idx="1"/>
+          </p:nvPr>
+        </p:nvSpPr>
+        <p:spPr>
+          <a:xfrm>
+            <a:off x="838200" y="3568364"/>
+            <a:ext cx="10515600" cy="2875467"/>
+          </a:xfrm>
+        </p:spPr>
+        <p:txBody>
+          <a:bodyPr>
+            <a:normAutofit/>
+          </a:bodyPr>
+          <a:lstStyle/>
+          <a:p>
+            <a:pPr marL="0" indent="0" algn="ctr">
+              <a:buNone/>
+            </a:pPr>
+            <a:endParaRPr lang="en-US" sz="2400" dirty="0"/>
+          </a:p>
+        </p:txBody>
+      </p:sp>
+    </p:spTree>
+    <p:extLst>
+      <p:ext uri="{BB962C8B-B14F-4D97-AF65-F5344CB8AC3E}">
+        <p14:creationId xmlns:p14="http://schemas.microsoft.com/office/powerpoint/2010/main" val="1564322208"/>
+      </p:ext>
+    </p:extLst>
+  </p:cSld>
+  <p:clrMapOvr>
+    <a:masterClrMapping/>
+  </p:clrMapOvr>
+  <p:timing>
+    <p:tnLst>
+      <p:par>
+        <p:cTn id="1" dur="indefinite" restart="never" nodeType="tmRoot"/>
+      </p:par>
+    </p:tnLst>
+  </p:timing>
+</p:sld>
+</file>
+
+<file path=ppt/slides/slide26.xml><?xml version="1.0" encoding="utf-8"?>
+<p:sld xmlns:a="http://schemas.openxmlformats.org/drawingml/2006/main" xmlns:r="http://schemas.openxmlformats.org/officeDocument/2006/relationships" xmlns:p="http://schemas.openxmlformats.org/presentationml/2006/main">
+  <p:cSld>
+    <p:spTree>
+      <p:nvGrpSpPr>
+        <p:cNvPr id="1" name=""/>
+        <p:cNvGrpSpPr/>
+        <p:nvPr/>
+      </p:nvGrpSpPr>
+      <p:grpSpPr>
+        <a:xfrm>
+          <a:off x="0" y="0"/>
+          <a:ext cx="0" cy="0"/>
+          <a:chOff x="0" y="0"/>
+          <a:chExt cx="0" cy="0"/>
+        </a:xfrm>
+      </p:grpSpPr>
+      <p:sp>
+        <p:nvSpPr>
+          <p:cNvPr id="2" name="Title 1"/>
+          <p:cNvSpPr>
+            <a:spLocks noGrp="1"/>
+          </p:cNvSpPr>
+          <p:nvPr>
+            <p:ph type="title"/>
+          </p:nvPr>
+        </p:nvSpPr>
+        <p:spPr/>
+        <p:txBody>
+          <a:bodyPr/>
+          <a:lstStyle/>
+          <a:p>
+            <a:r>
+              <a:rPr lang="en-US" dirty="0" smtClean="0"/>
+              <a:t>The evolution of our Question</a:t>
+            </a:r>
+            <a:endParaRPr lang="en-US" dirty="0"/>
+          </a:p>
+        </p:txBody>
+      </p:sp>
+      <p:sp>
+        <p:nvSpPr>
+          <p:cNvPr id="3" name="Content Placeholder 2"/>
+          <p:cNvSpPr>
+            <a:spLocks noGrp="1"/>
+          </p:cNvSpPr>
+          <p:nvPr>
+            <p:ph idx="1"/>
+          </p:nvPr>
+        </p:nvSpPr>
+        <p:spPr/>
+        <p:txBody>
+          <a:bodyPr/>
+          <a:lstStyle/>
+          <a:p>
+            <a:pPr lvl="1"/>
+            <a:r>
+              <a:rPr lang="en-US" dirty="0"/>
+              <a:t>Initial </a:t>
+            </a:r>
+            <a:r>
+              <a:rPr lang="en-US" dirty="0" smtClean="0"/>
+              <a:t>Ideas</a:t>
+            </a:r>
+            <a:r>
+              <a:rPr lang="en-US" dirty="0" smtClean="0"/>
+              <a:t>:</a:t>
+            </a:r>
+            <a:endParaRPr lang="en-US" dirty="0" smtClean="0"/>
+          </a:p>
+          <a:p>
+            <a:pPr lvl="2"/>
+            <a:r>
+              <a:rPr lang="en-US" dirty="0" smtClean="0"/>
+              <a:t>Do Political Contributes  by sectors affect whether candidates win?</a:t>
+            </a:r>
+          </a:p>
+          <a:p>
+            <a:pPr lvl="2"/>
+            <a:r>
+              <a:rPr lang="en-US" dirty="0" smtClean="0"/>
+              <a:t>Do election </a:t>
+            </a:r>
+            <a:r>
+              <a:rPr lang="en-US" dirty="0"/>
+              <a:t>results had any specific impact on the market as a whole</a:t>
+            </a:r>
+            <a:r>
+              <a:rPr lang="en-US" dirty="0" smtClean="0"/>
+              <a:t>.?</a:t>
+            </a:r>
+            <a:endParaRPr lang="en-US" dirty="0"/>
+          </a:p>
+          <a:p>
+            <a:pPr lvl="1"/>
+            <a:endParaRPr lang="en-US" dirty="0"/>
+          </a:p>
+          <a:p>
+            <a:pPr lvl="1"/>
+            <a:r>
+              <a:rPr lang="en-US" dirty="0" smtClean="0"/>
+              <a:t>Resulting </a:t>
+            </a:r>
+            <a:r>
+              <a:rPr lang="en-US" dirty="0"/>
+              <a:t>Analyses</a:t>
+            </a:r>
+          </a:p>
+          <a:p>
+            <a:pPr lvl="2"/>
+            <a:r>
+              <a:rPr lang="en-US" dirty="0" smtClean="0"/>
+              <a:t>The </a:t>
+            </a:r>
+            <a:r>
+              <a:rPr lang="en-US" dirty="0" smtClean="0"/>
+              <a:t>idea morphed into looking at total campaign contributions </a:t>
+            </a:r>
+          </a:p>
+          <a:p>
+            <a:pPr lvl="2"/>
+            <a:r>
+              <a:rPr lang="en-US" dirty="0" smtClean="0"/>
+              <a:t>Due to uncovering very little with respect to stock changes and voting shifts </a:t>
+            </a:r>
+          </a:p>
+          <a:p>
+            <a:pPr lvl="3"/>
+            <a:r>
+              <a:rPr lang="en-US" dirty="0" smtClean="0"/>
+              <a:t>An interesting paradox is the Financial Crisis</a:t>
+            </a:r>
+          </a:p>
+        </p:txBody>
+      </p:sp>
+    </p:spTree>
+    <p:extLst>
+      <p:ext uri="{BB962C8B-B14F-4D97-AF65-F5344CB8AC3E}">
+        <p14:creationId xmlns:p14="http://schemas.microsoft.com/office/powerpoint/2010/main" val="394179291"/>
+      </p:ext>
+    </p:extLst>
+  </p:cSld>
+  <p:clrMapOvr>
+    <a:masterClrMapping/>
+  </p:clrMapOvr>
+  <p:transition spd="slow">
+    <p:push dir="u"/>
+  </p:transition>
+  <p:timing>
+    <p:tnLst>
+      <p:par>
+        <p:cTn id="1" dur="indefinite" restart="never" nodeType="tmRoot">
+          <p:childTnLst>
+            <p:seq concurrent="1" nextAc="seek">
+              <p:cTn id="2" dur="indefinite" nodeType="mainSeq">
+                <p:childTnLst>
+                  <p:par>
+                    <p:cTn id="3" fill="hold">
+                      <p:stCondLst>
+                        <p:cond delay="indefinite"/>
+                      </p:stCondLst>
+                      <p:childTnLst>
+                        <p:par>
+                          <p:cTn id="4" fill="hold">
+                            <p:stCondLst>
+                              <p:cond delay="0"/>
+                            </p:stCondLst>
+                            <p:childTnLst>
+                              <p:par>
+                                <p:cTn id="5" presetID="1" presetClass="entr" presetSubtype="0" fill="hold" nodeType="clickEffect">
+                                  <p:stCondLst>
+                                    <p:cond delay="0"/>
+                                  </p:stCondLst>
+                                  <p:childTnLst>
+                                    <p:set>
+                                      <p:cBhvr>
+                                        <p:cTn id="6" dur="1" fill="hold">
+                                          <p:stCondLst>
+                                            <p:cond delay="0"/>
+                                          </p:stCondLst>
+                                        </p:cTn>
+                                        <p:tgtEl>
+                                          <p:spTgt spid="3">
+                                            <p:txEl>
+                                              <p:pRg st="0" end="0"/>
+                                            </p:txEl>
+                                          </p:spTgt>
+                                        </p:tgtEl>
+                                        <p:attrNameLst>
+                                          <p:attrName>style.visibility</p:attrName>
+                                        </p:attrNameLst>
+                                      </p:cBhvr>
+                                      <p:to>
+                                        <p:strVal val="visible"/>
+                                      </p:to>
+                                    </p:set>
+                                  </p:childTnLst>
+                                </p:cTn>
+                              </p:par>
+                            </p:childTnLst>
+                          </p:cTn>
+                        </p:par>
+                      </p:childTnLst>
+                    </p:cTn>
+                  </p:par>
+                  <p:par>
+                    <p:cTn id="7" fill="hold">
+                      <p:stCondLst>
+                        <p:cond delay="indefinite"/>
+                      </p:stCondLst>
+                      <p:childTnLst>
+                        <p:par>
+                          <p:cTn id="8" fill="hold">
+                            <p:stCondLst>
+                              <p:cond delay="0"/>
+                            </p:stCondLst>
+                            <p:childTnLst>
+                              <p:par>
+                                <p:cTn id="9" presetID="1" presetClass="entr" presetSubtype="0" fill="hold" nodeType="clickEffect">
+                                  <p:stCondLst>
+                                    <p:cond delay="0"/>
+                                  </p:stCondLst>
+                                  <p:childTnLst>
+                                    <p:set>
+                                      <p:cBhvr>
+                                        <p:cTn id="10" dur="1" fill="hold">
+                                          <p:stCondLst>
+                                            <p:cond delay="0"/>
+                                          </p:stCondLst>
+                                        </p:cTn>
+                                        <p:tgtEl>
+                                          <p:spTgt spid="3">
+                                            <p:txEl>
+                                              <p:pRg st="1" end="1"/>
+                                            </p:txEl>
+                                          </p:spTgt>
+                                        </p:tgtEl>
+                                        <p:attrNameLst>
+                                          <p:attrName>style.visibility</p:attrName>
+                                        </p:attrNameLst>
+                                      </p:cBhvr>
+                                      <p:to>
+                                        <p:strVal val="visible"/>
+                                      </p:to>
+                                    </p:set>
+                                  </p:childTnLst>
+                                </p:cTn>
+                              </p:par>
+                              <p:par>
+                                <p:cTn id="11" presetID="1" presetClass="entr" presetSubtype="0" fill="hold" nodeType="withEffect">
+                                  <p:stCondLst>
+                                    <p:cond delay="0"/>
+                                  </p:stCondLst>
+                                  <p:childTnLst>
+                                    <p:set>
+                                      <p:cBhvr>
+                                        <p:cTn id="12" dur="1" fill="hold">
+                                          <p:stCondLst>
+                                            <p:cond delay="0"/>
+                                          </p:stCondLst>
+                                        </p:cTn>
+                                        <p:tgtEl>
+                                          <p:spTgt spid="3">
+                                            <p:txEl>
+                                              <p:pRg st="2" end="2"/>
+                                            </p:txEl>
+                                          </p:spTgt>
+                                        </p:tgtEl>
+                                        <p:attrNameLst>
+                                          <p:attrName>style.visibility</p:attrName>
+                                        </p:attrNameLst>
+                                      </p:cBhvr>
+                                      <p:to>
+                                        <p:strVal val="visible"/>
+                                      </p:to>
+                                    </p:set>
+                                  </p:childTnLst>
+                                </p:cTn>
+                              </p:par>
+                            </p:childTnLst>
+                          </p:cTn>
+                        </p:par>
+                      </p:childTnLst>
+                    </p:cTn>
+                  </p:par>
+                  <p:par>
+                    <p:cTn id="13" fill="hold">
+                      <p:stCondLst>
+                        <p:cond delay="indefinite"/>
+                      </p:stCondLst>
+                      <p:childTnLst>
+                        <p:par>
+                          <p:cTn id="14" fill="hold">
+                            <p:stCondLst>
+                              <p:cond delay="0"/>
+                            </p:stCondLst>
+                            <p:childTnLst>
+                              <p:par>
+                                <p:cTn id="15" presetID="1" presetClass="entr" presetSubtype="0" fill="hold" nodeType="clickEffect">
+                                  <p:stCondLst>
+                                    <p:cond delay="0"/>
+                                  </p:stCondLst>
+                                  <p:childTnLst>
+                                    <p:set>
+                                      <p:cBhvr>
+                                        <p:cTn id="16" dur="1" fill="hold">
+                                          <p:stCondLst>
+                                            <p:cond delay="0"/>
+                                          </p:stCondLst>
+                                        </p:cTn>
+                                        <p:tgtEl>
+                                          <p:spTgt spid="3">
+                                            <p:txEl>
+                                              <p:pRg st="4" end="4"/>
+                                            </p:txEl>
+                                          </p:spTgt>
+                                        </p:tgtEl>
+                                        <p:attrNameLst>
+                                          <p:attrName>style.visibility</p:attrName>
+                                        </p:attrNameLst>
+                                      </p:cBhvr>
+                                      <p:to>
+                                        <p:strVal val="visible"/>
+                                      </p:to>
+                                    </p:set>
+                                  </p:childTnLst>
+                                </p:cTn>
+                              </p:par>
+                            </p:childTnLst>
+                          </p:cTn>
+                        </p:par>
+                      </p:childTnLst>
+                    </p:cTn>
+                  </p:par>
+                  <p:par>
+                    <p:cTn id="17" fill="hold">
+                      <p:stCondLst>
+                        <p:cond delay="indefinite"/>
+                      </p:stCondLst>
+                      <p:childTnLst>
+                        <p:par>
+                          <p:cTn id="18" fill="hold">
+                            <p:stCondLst>
+                              <p:cond delay="0"/>
+                            </p:stCondLst>
+                            <p:childTnLst>
+                              <p:par>
+                                <p:cTn id="19" presetID="1" presetClass="entr" presetSubtype="0" fill="hold" nodeType="clickEffect">
+                                  <p:stCondLst>
+                                    <p:cond delay="0"/>
+                                  </p:stCondLst>
+                                  <p:childTnLst>
+                                    <p:set>
+                                      <p:cBhvr>
+                                        <p:cTn id="20" dur="1" fill="hold">
+                                          <p:stCondLst>
+                                            <p:cond delay="0"/>
+                                          </p:stCondLst>
+                                        </p:cTn>
+                                        <p:tgtEl>
+                                          <p:spTgt spid="3">
+                                            <p:txEl>
+                                              <p:pRg st="5" end="5"/>
+                                            </p:txEl>
+                                          </p:spTgt>
+                                        </p:tgtEl>
+                                        <p:attrNameLst>
+                                          <p:attrName>style.visibility</p:attrName>
+                                        </p:attrNameLst>
+                                      </p:cBhvr>
+                                      <p:to>
+                                        <p:strVal val="visible"/>
+                                      </p:to>
+                                    </p:set>
+                                  </p:childTnLst>
+                                </p:cTn>
+                              </p:par>
+                              <p:par>
+                                <p:cTn id="21" presetID="1" presetClass="entr" presetSubtype="0" fill="hold" nodeType="withEffect">
+                                  <p:stCondLst>
+                                    <p:cond delay="0"/>
+                                  </p:stCondLst>
+                                  <p:childTnLst>
+                                    <p:set>
+                                      <p:cBhvr>
+                                        <p:cTn id="22" dur="1" fill="hold">
+                                          <p:stCondLst>
+                                            <p:cond delay="0"/>
+                                          </p:stCondLst>
+                                        </p:cTn>
+                                        <p:tgtEl>
+                                          <p:spTgt spid="3">
+                                            <p:txEl>
+                                              <p:pRg st="6" end="6"/>
+                                            </p:txEl>
+                                          </p:spTgt>
+                                        </p:tgtEl>
+                                        <p:attrNameLst>
+                                          <p:attrName>style.visibility</p:attrName>
+                                        </p:attrNameLst>
+                                      </p:cBhvr>
+                                      <p:to>
+                                        <p:strVal val="visible"/>
+                                      </p:to>
+                                    </p:set>
+                                  </p:childTnLst>
+                                </p:cTn>
+                              </p:par>
+                            </p:childTnLst>
+                          </p:cTn>
+                        </p:par>
+                      </p:childTnLst>
+                    </p:cTn>
+                  </p:par>
+                  <p:par>
+                    <p:cTn id="23" fill="hold">
+                      <p:stCondLst>
+                        <p:cond delay="indefinite"/>
+                      </p:stCondLst>
+                      <p:childTnLst>
+                        <p:par>
+                          <p:cTn id="24" fill="hold">
+                            <p:stCondLst>
+                              <p:cond delay="0"/>
+                            </p:stCondLst>
+                            <p:childTnLst>
+                              <p:par>
+                                <p:cTn id="25" presetID="1" presetClass="entr" presetSubtype="0" fill="hold" nodeType="clickEffect">
+                                  <p:stCondLst>
+                                    <p:cond delay="0"/>
+                                  </p:stCondLst>
+                                  <p:childTnLst>
+                                    <p:set>
+                                      <p:cBhvr>
+                                        <p:cTn id="26" dur="1" fill="hold">
+                                          <p:stCondLst>
+                                            <p:cond delay="0"/>
+                                          </p:stCondLst>
+                                        </p:cTn>
+                                        <p:tgtEl>
+                                          <p:spTgt spid="3">
+                                            <p:txEl>
+                                              <p:pRg st="7" end="7"/>
+                                            </p:txEl>
+                                          </p:spTgt>
+                                        </p:tgtEl>
+                                        <p:attrNameLst>
+                                          <p:attrName>style.visibility</p:attrName>
+                                        </p:attrNameLst>
+                                      </p:cBhvr>
+                                      <p:to>
+                                        <p:strVal val="visible"/>
+                                      </p:to>
+                                    </p:set>
+                                  </p:childTnLst>
+                                </p:cTn>
+                              </p:par>
+                            </p:childTnLst>
+                          </p:cTn>
+                        </p:par>
+                      </p:childTnLst>
+                    </p:cTn>
+                  </p:par>
+                </p:childTnLst>
+              </p:cTn>
+              <p:prevCondLst>
+                <p:cond evt="onPrev" delay="0">
+                  <p:tgtEl>
+                    <p:sldTgt/>
+                  </p:tgtEl>
+                </p:cond>
+              </p:prevCondLst>
+              <p:nextCondLst>
+                <p:cond evt="onNext" delay="0">
+                  <p:tgtEl>
+                    <p:sldTgt/>
+                  </p:tgtEl>
+                </p:cond>
+              </p:nextCondLst>
+            </p:seq>
+          </p:childTnLst>
+        </p:cTn>
+      </p:par>
+    </p:tnLst>
+  </p:timing>
+</p:sld>
+</file>
+
+<file path=ppt/slides/slide27.xml><?xml version="1.0" encoding="utf-8"?>
+<p:sld xmlns:a="http://schemas.openxmlformats.org/drawingml/2006/main" xmlns:r="http://schemas.openxmlformats.org/officeDocument/2006/relationships" xmlns:p="http://schemas.openxmlformats.org/presentationml/2006/main">
+  <p:cSld>
+    <p:spTree>
+      <p:nvGrpSpPr>
+        <p:cNvPr id="1" name=""/>
+        <p:cNvGrpSpPr/>
+        <p:nvPr/>
+      </p:nvGrpSpPr>
+      <p:grpSpPr>
+        <a:xfrm>
+          <a:off x="0" y="0"/>
+          <a:ext cx="0" cy="0"/>
+          <a:chOff x="0" y="0"/>
+          <a:chExt cx="0" cy="0"/>
+        </a:xfrm>
+      </p:grpSpPr>
+      <p:sp>
+        <p:nvSpPr>
+          <p:cNvPr id="2" name="Title 1"/>
+          <p:cNvSpPr>
+            <a:spLocks noGrp="1"/>
+          </p:cNvSpPr>
+          <p:nvPr>
+            <p:ph type="title"/>
+          </p:nvPr>
+        </p:nvSpPr>
+        <p:spPr/>
+        <p:txBody>
+          <a:bodyPr/>
+          <a:lstStyle/>
+          <a:p>
+            <a:r>
+              <a:rPr lang="en-US" dirty="0" smtClean="0"/>
+              <a:t>Some takeaways</a:t>
+            </a:r>
+            <a:endParaRPr lang="en-US" dirty="0"/>
+          </a:p>
+        </p:txBody>
+      </p:sp>
+      <p:sp>
+        <p:nvSpPr>
+          <p:cNvPr id="3" name="Content Placeholder 2"/>
+          <p:cNvSpPr>
+            <a:spLocks noGrp="1"/>
+          </p:cNvSpPr>
+          <p:nvPr>
+            <p:ph idx="1"/>
+          </p:nvPr>
+        </p:nvSpPr>
+        <p:spPr/>
+        <p:txBody>
+          <a:bodyPr/>
+          <a:lstStyle/>
+          <a:p>
+            <a:r>
+              <a:rPr lang="en-US" dirty="0"/>
+              <a:t>Many of our conclusions supported already expected conclusions, but no major breakthroughs that were uncovered</a:t>
+            </a:r>
+          </a:p>
+          <a:p>
+            <a:r>
+              <a:rPr lang="en-US" dirty="0" smtClean="0"/>
+              <a:t>Stocks </a:t>
+            </a:r>
+            <a:r>
+              <a:rPr lang="en-US" dirty="0" smtClean="0"/>
+              <a:t>aren’t significantly affected by election results</a:t>
+            </a:r>
+          </a:p>
+          <a:p>
+            <a:r>
+              <a:rPr lang="en-US" dirty="0"/>
+              <a:t>Non-incumbent candidates, regardless of party, are dead-money</a:t>
+            </a:r>
+          </a:p>
+          <a:p>
+            <a:endParaRPr lang="en-US" dirty="0"/>
+          </a:p>
+        </p:txBody>
+      </p:sp>
+    </p:spTree>
+    <p:extLst>
+      <p:ext uri="{BB962C8B-B14F-4D97-AF65-F5344CB8AC3E}">
+        <p14:creationId xmlns:p14="http://schemas.microsoft.com/office/powerpoint/2010/main" val="2131776489"/>
+      </p:ext>
+    </p:extLst>
+  </p:cSld>
+  <p:clrMapOvr>
+    <a:masterClrMapping/>
+  </p:clrMapOvr>
+  <p:timing>
+    <p:tnLst>
+      <p:par>
+        <p:cTn id="1" dur="indefinite" restart="never" nodeType="tmRoot">
+          <p:childTnLst>
+            <p:seq concurrent="1" nextAc="seek">
+              <p:cTn id="2" dur="indefinite" nodeType="mainSeq">
+                <p:childTnLst>
+                  <p:par>
+                    <p:cTn id="3" fill="hold">
+                      <p:stCondLst>
+                        <p:cond delay="indefinite"/>
+                      </p:stCondLst>
+                      <p:childTnLst>
+                        <p:par>
+                          <p:cTn id="4" fill="hold">
+                            <p:stCondLst>
+                              <p:cond delay="0"/>
+                            </p:stCondLst>
+                            <p:childTnLst>
+                              <p:par>
+                                <p:cTn id="5" presetID="1" presetClass="entr" presetSubtype="0" fill="hold" nodeType="clickEffect">
+                                  <p:stCondLst>
+                                    <p:cond delay="0"/>
+                                  </p:stCondLst>
+                                  <p:childTnLst>
+                                    <p:set>
+                                      <p:cBhvr>
+                                        <p:cTn id="6" dur="1" fill="hold">
+                                          <p:stCondLst>
+                                            <p:cond delay="0"/>
+                                          </p:stCondLst>
+                                        </p:cTn>
+                                        <p:tgtEl>
+                                          <p:spTgt spid="3">
+                                            <p:txEl>
+                                              <p:pRg st="0" end="0"/>
+                                            </p:txEl>
+                                          </p:spTgt>
+                                        </p:tgtEl>
+                                        <p:attrNameLst>
+                                          <p:attrName>style.visibility</p:attrName>
+                                        </p:attrNameLst>
+                                      </p:cBhvr>
+                                      <p:to>
+                                        <p:strVal val="visible"/>
+                                      </p:to>
+                                    </p:set>
+                                  </p:childTnLst>
+                                </p:cTn>
+                              </p:par>
+                            </p:childTnLst>
+                          </p:cTn>
+                        </p:par>
+                      </p:childTnLst>
+                    </p:cTn>
+                  </p:par>
+                  <p:par>
+                    <p:cTn id="7" fill="hold">
+                      <p:stCondLst>
+                        <p:cond delay="indefinite"/>
+                      </p:stCondLst>
+                      <p:childTnLst>
+                        <p:par>
+                          <p:cTn id="8" fill="hold">
+                            <p:stCondLst>
+                              <p:cond delay="0"/>
+                            </p:stCondLst>
+                            <p:childTnLst>
+                              <p:par>
+                                <p:cTn id="9" presetID="1" presetClass="entr" presetSubtype="0" fill="hold" nodeType="clickEffect">
+                                  <p:stCondLst>
+                                    <p:cond delay="0"/>
+                                  </p:stCondLst>
+                                  <p:childTnLst>
+                                    <p:set>
+                                      <p:cBhvr>
+                                        <p:cTn id="10" dur="1" fill="hold">
+                                          <p:stCondLst>
+                                            <p:cond delay="0"/>
+                                          </p:stCondLst>
+                                        </p:cTn>
+                                        <p:tgtEl>
+                                          <p:spTgt spid="3">
+                                            <p:txEl>
+                                              <p:pRg st="1" end="1"/>
+                                            </p:txEl>
+                                          </p:spTgt>
+                                        </p:tgtEl>
+                                        <p:attrNameLst>
+                                          <p:attrName>style.visibility</p:attrName>
+                                        </p:attrNameLst>
+                                      </p:cBhvr>
+                                      <p:to>
+                                        <p:strVal val="visible"/>
+                                      </p:to>
+                                    </p:set>
+                                  </p:childTnLst>
+                                </p:cTn>
+                              </p:par>
+                            </p:childTnLst>
+                          </p:cTn>
+                        </p:par>
+                      </p:childTnLst>
+                    </p:cTn>
+                  </p:par>
+                </p:childTnLst>
+              </p:cTn>
+              <p:prevCondLst>
+                <p:cond evt="onPrev" delay="0">
+                  <p:tgtEl>
+                    <p:sldTgt/>
+                  </p:tgtEl>
+                </p:cond>
+              </p:prevCondLst>
+              <p:nextCondLst>
+                <p:cond evt="onNext" delay="0">
+                  <p:tgtEl>
+                    <p:sldTgt/>
+                  </p:tgtEl>
+                </p:cond>
+              </p:nextCondLst>
+            </p:seq>
+          </p:childTnLst>
+        </p:cTn>
+      </p:par>
+    </p:tnLst>
+  </p:timing>
+</p:sld>
+</file>
+
+<file path=ppt/slides/slide28.xml><?xml version="1.0" encoding="utf-8"?>
+<p:sld xmlns:a="http://schemas.openxmlformats.org/drawingml/2006/main" xmlns:r="http://schemas.openxmlformats.org/officeDocument/2006/relationships" xmlns:p="http://schemas.openxmlformats.org/presentationml/2006/main">
+  <p:cSld>
+    <p:spTree>
+      <p:nvGrpSpPr>
+        <p:cNvPr id="1" name=""/>
+        <p:cNvGrpSpPr/>
+        <p:nvPr/>
+      </p:nvGrpSpPr>
+      <p:grpSpPr>
+        <a:xfrm>
+          <a:off x="0" y="0"/>
+          <a:ext cx="0" cy="0"/>
+          <a:chOff x="0" y="0"/>
+          <a:chExt cx="0" cy="0"/>
+        </a:xfrm>
+      </p:grpSpPr>
+      <p:sp>
+        <p:nvSpPr>
+          <p:cNvPr id="2" name="Title 1"/>
+          <p:cNvSpPr>
+            <a:spLocks noGrp="1"/>
+          </p:cNvSpPr>
+          <p:nvPr>
+            <p:ph type="title"/>
+          </p:nvPr>
+        </p:nvSpPr>
+        <p:spPr/>
+        <p:txBody>
+          <a:bodyPr/>
+          <a:lstStyle/>
+          <a:p>
+            <a:r>
+              <a:rPr lang="en-US" dirty="0" smtClean="0"/>
+              <a:t>A </a:t>
+            </a:r>
+            <a:r>
+              <a:rPr lang="en-US" dirty="0"/>
+              <a:t>C</a:t>
+            </a:r>
+            <a:r>
+              <a:rPr lang="en-US" dirty="0" smtClean="0"/>
+              <a:t>ool Visualization</a:t>
+            </a:r>
+            <a:endParaRPr lang="en-US" dirty="0"/>
+          </a:p>
+        </p:txBody>
+      </p:sp>
+      <p:sp>
+        <p:nvSpPr>
+          <p:cNvPr id="3" name="Content Placeholder 2"/>
+          <p:cNvSpPr>
+            <a:spLocks noGrp="1"/>
+          </p:cNvSpPr>
+          <p:nvPr>
+            <p:ph idx="1"/>
+          </p:nvPr>
+        </p:nvSpPr>
+        <p:spPr/>
+        <p:txBody>
+          <a:bodyPr/>
+          <a:lstStyle/>
+          <a:p>
+            <a:r>
+              <a:rPr lang="en-US" dirty="0">
+                <a:hlinkClick r:id="rId3"/>
+              </a:rPr>
+              <a:t>http://cs-sys-1.uis.georgetown.edu/~</a:t>
+            </a:r>
+            <a:r>
+              <a:rPr lang="en-US" dirty="0" smtClean="0">
+                <a:hlinkClick r:id="rId3"/>
+              </a:rPr>
+              <a:t>hw271/ds_visualization/USCongressionalDistrict/index.html</a:t>
+            </a:r>
+            <a:endParaRPr lang="en-US" dirty="0" smtClean="0"/>
+          </a:p>
+          <a:p>
+            <a:endParaRPr lang="en-US" dirty="0"/>
+          </a:p>
+        </p:txBody>
+      </p:sp>
+    </p:spTree>
+    <p:extLst>
+      <p:ext uri="{BB962C8B-B14F-4D97-AF65-F5344CB8AC3E}">
+        <p14:creationId xmlns:p14="http://schemas.microsoft.com/office/powerpoint/2010/main" val="1516002729"/>
+      </p:ext>
+    </p:extLst>
+  </p:cSld>
+  <p:clrMapOvr>
+    <a:masterClrMapping/>
+  </p:clrMapOvr>
 </p:sld>
 </file>
 

</xml_diff>